<commit_message>
Updated diagram as per AWS Feedback
</commit_message>
<xml_diff>
--- a/docs/diagram.pptx
+++ b/docs/diagram.pptx
@@ -263,7 +263,7 @@
           <a:p>
             <a:fld id="{1100E845-DD53-4B2C-8630-61653077C2D5}" type="datetimeFigureOut">
               <a:rPr lang="en-US" smtClean="0"/>
-              <a:t>11/17/2017</a:t>
+              <a:t>11/22/2017</a:t>
             </a:fld>
             <a:endParaRPr lang="en-US"/>
           </a:p>
@@ -461,7 +461,7 @@
           <a:p>
             <a:fld id="{1100E845-DD53-4B2C-8630-61653077C2D5}" type="datetimeFigureOut">
               <a:rPr lang="en-US" smtClean="0"/>
-              <a:t>11/17/2017</a:t>
+              <a:t>11/22/2017</a:t>
             </a:fld>
             <a:endParaRPr lang="en-US"/>
           </a:p>
@@ -669,7 +669,7 @@
           <a:p>
             <a:fld id="{1100E845-DD53-4B2C-8630-61653077C2D5}" type="datetimeFigureOut">
               <a:rPr lang="en-US" smtClean="0"/>
-              <a:t>11/17/2017</a:t>
+              <a:t>11/22/2017</a:t>
             </a:fld>
             <a:endParaRPr lang="en-US"/>
           </a:p>
@@ -867,7 +867,7 @@
           <a:p>
             <a:fld id="{1100E845-DD53-4B2C-8630-61653077C2D5}" type="datetimeFigureOut">
               <a:rPr lang="en-US" smtClean="0"/>
-              <a:t>11/17/2017</a:t>
+              <a:t>11/22/2017</a:t>
             </a:fld>
             <a:endParaRPr lang="en-US"/>
           </a:p>
@@ -1142,7 +1142,7 @@
           <a:p>
             <a:fld id="{1100E845-DD53-4B2C-8630-61653077C2D5}" type="datetimeFigureOut">
               <a:rPr lang="en-US" smtClean="0"/>
-              <a:t>11/17/2017</a:t>
+              <a:t>11/22/2017</a:t>
             </a:fld>
             <a:endParaRPr lang="en-US"/>
           </a:p>
@@ -1407,7 +1407,7 @@
           <a:p>
             <a:fld id="{1100E845-DD53-4B2C-8630-61653077C2D5}" type="datetimeFigureOut">
               <a:rPr lang="en-US" smtClean="0"/>
-              <a:t>11/17/2017</a:t>
+              <a:t>11/22/2017</a:t>
             </a:fld>
             <a:endParaRPr lang="en-US"/>
           </a:p>
@@ -1819,7 +1819,7 @@
           <a:p>
             <a:fld id="{1100E845-DD53-4B2C-8630-61653077C2D5}" type="datetimeFigureOut">
               <a:rPr lang="en-US" smtClean="0"/>
-              <a:t>11/17/2017</a:t>
+              <a:t>11/22/2017</a:t>
             </a:fld>
             <a:endParaRPr lang="en-US"/>
           </a:p>
@@ -1960,7 +1960,7 @@
           <a:p>
             <a:fld id="{1100E845-DD53-4B2C-8630-61653077C2D5}" type="datetimeFigureOut">
               <a:rPr lang="en-US" smtClean="0"/>
-              <a:t>11/17/2017</a:t>
+              <a:t>11/22/2017</a:t>
             </a:fld>
             <a:endParaRPr lang="en-US"/>
           </a:p>
@@ -2073,7 +2073,7 @@
           <a:p>
             <a:fld id="{1100E845-DD53-4B2C-8630-61653077C2D5}" type="datetimeFigureOut">
               <a:rPr lang="en-US" smtClean="0"/>
-              <a:t>11/17/2017</a:t>
+              <a:t>11/22/2017</a:t>
             </a:fld>
             <a:endParaRPr lang="en-US"/>
           </a:p>
@@ -2384,7 +2384,7 @@
           <a:p>
             <a:fld id="{1100E845-DD53-4B2C-8630-61653077C2D5}" type="datetimeFigureOut">
               <a:rPr lang="en-US" smtClean="0"/>
-              <a:t>11/17/2017</a:t>
+              <a:t>11/22/2017</a:t>
             </a:fld>
             <a:endParaRPr lang="en-US"/>
           </a:p>
@@ -2672,7 +2672,7 @@
           <a:p>
             <a:fld id="{1100E845-DD53-4B2C-8630-61653077C2D5}" type="datetimeFigureOut">
               <a:rPr lang="en-US" smtClean="0"/>
-              <a:t>11/17/2017</a:t>
+              <a:t>11/22/2017</a:t>
             </a:fld>
             <a:endParaRPr lang="en-US"/>
           </a:p>
@@ -2913,7 +2913,7 @@
           <a:p>
             <a:fld id="{1100E845-DD53-4B2C-8630-61653077C2D5}" type="datetimeFigureOut">
               <a:rPr lang="en-US" smtClean="0"/>
-              <a:t>11/17/2017</a:t>
+              <a:t>11/22/2017</a:t>
             </a:fld>
             <a:endParaRPr lang="en-US"/>
           </a:p>
@@ -3332,10 +3332,10 @@
       </p:grpSpPr>
       <p:sp>
         <p:nvSpPr>
-          <p:cNvPr id="4" name="Rounded Rectangle 9">
-            <a:extLst>
-              <a:ext uri="{FF2B5EF4-FFF2-40B4-BE49-F238E27FC236}">
-                <a16:creationId xmlns:a16="http://schemas.microsoft.com/office/drawing/2014/main" id="{E0D017E5-3AA4-477E-8996-B56DB9FA059A}"/>
+          <p:cNvPr id="36" name="Rounded Rectangle 14">
+            <a:extLst>
+              <a:ext uri="{FF2B5EF4-FFF2-40B4-BE49-F238E27FC236}">
+                <a16:creationId xmlns:a16="http://schemas.microsoft.com/office/drawing/2014/main" id="{88D19EC8-AE1F-43DE-915F-B0F3DC0B74A1}"/>
               </a:ext>
             </a:extLst>
           </p:cNvPr>
@@ -3344,8 +3344,159 @@
         </p:nvSpPr>
         <p:spPr>
           <a:xfrm>
-            <a:off x="2767204" y="1709817"/>
-            <a:ext cx="6156134" cy="3413125"/>
+            <a:off x="3942995" y="2040016"/>
+            <a:ext cx="5705671" cy="2660113"/>
+          </a:xfrm>
+          <a:prstGeom prst="roundRect">
+            <a:avLst>
+              <a:gd name="adj" fmla="val 9818"/>
+            </a:avLst>
+          </a:prstGeom>
+          <a:solidFill>
+            <a:schemeClr val="accent2">
+              <a:alpha val="25000"/>
+            </a:schemeClr>
+          </a:solidFill>
+          <a:ln w="19050">
+            <a:solidFill>
+              <a:srgbClr val="F7981F"/>
+            </a:solidFill>
+            <a:prstDash val="lgDash"/>
+          </a:ln>
+          <a:effectLst/>
+        </p:spPr>
+        <p:style>
+          <a:lnRef idx="1">
+            <a:schemeClr val="accent1"/>
+          </a:lnRef>
+          <a:fillRef idx="3">
+            <a:schemeClr val="accent1"/>
+          </a:fillRef>
+          <a:effectRef idx="2">
+            <a:schemeClr val="accent1"/>
+          </a:effectRef>
+          <a:fontRef idx="minor">
+            <a:schemeClr val="lt1"/>
+          </a:fontRef>
+        </p:style>
+        <p:txBody>
+          <a:bodyPr anchor="t"/>
+          <a:lstStyle/>
+          <a:p>
+            <a:pPr algn="ctr" fontAlgn="auto">
+              <a:spcBef>
+                <a:spcPts val="0"/>
+              </a:spcBef>
+              <a:spcAft>
+                <a:spcPts val="0"/>
+              </a:spcAft>
+              <a:defRPr/>
+            </a:pPr>
+            <a:endParaRPr lang="en-US" dirty="0">
+              <a:solidFill>
+                <a:schemeClr val="tx1"/>
+              </a:solidFill>
+              <a:latin typeface="Amazon Ember" charset="0"/>
+              <a:ea typeface="Amazon Ember" charset="0"/>
+              <a:cs typeface="Amazon Ember" charset="0"/>
+            </a:endParaRPr>
+          </a:p>
+        </p:txBody>
+      </p:sp>
+      <p:pic>
+        <p:nvPicPr>
+          <p:cNvPr id="42" name="Graphic 41">
+            <a:extLst>
+              <a:ext uri="{FF2B5EF4-FFF2-40B4-BE49-F238E27FC236}">
+                <a16:creationId xmlns:a16="http://schemas.microsoft.com/office/drawing/2014/main" id="{7DC0AA00-CE7D-4E7A-8976-BF6BD567C0D3}"/>
+              </a:ext>
+            </a:extLst>
+          </p:cNvPr>
+          <p:cNvPicPr>
+            <a:picLocks noChangeAspect="1"/>
+          </p:cNvPicPr>
+          <p:nvPr/>
+        </p:nvPicPr>
+        <p:blipFill>
+          <a:blip r:embed="rId2">
+            <a:extLst>
+              <a:ext uri="{28A0092B-C50C-407E-A947-70E740481C1C}">
+                <a14:useLocalDpi xmlns:a14="http://schemas.microsoft.com/office/drawing/2010/main" val="0"/>
+              </a:ext>
+              <a:ext uri="{96DAC541-7B7A-43D3-8B79-37D633B846F1}">
+                <asvg:svgBlip xmlns:asvg="http://schemas.microsoft.com/office/drawing/2016/SVG/main" r:embed="rId3"/>
+              </a:ext>
+            </a:extLst>
+          </a:blip>
+          <a:stretch>
+            <a:fillRect/>
+          </a:stretch>
+        </p:blipFill>
+        <p:spPr>
+          <a:xfrm>
+            <a:off x="4899478" y="2981421"/>
+            <a:ext cx="952500" cy="952500"/>
+          </a:xfrm>
+          <a:prstGeom prst="rect">
+            <a:avLst/>
+          </a:prstGeom>
+        </p:spPr>
+      </p:pic>
+      <p:pic>
+        <p:nvPicPr>
+          <p:cNvPr id="48" name="Graphic 47">
+            <a:extLst>
+              <a:ext uri="{FF2B5EF4-FFF2-40B4-BE49-F238E27FC236}">
+                <a16:creationId xmlns:a16="http://schemas.microsoft.com/office/drawing/2014/main" id="{A6398F71-E5DE-4655-AC6A-E38F0BED3C50}"/>
+              </a:ext>
+            </a:extLst>
+          </p:cNvPr>
+          <p:cNvPicPr>
+            <a:picLocks noChangeAspect="1"/>
+          </p:cNvPicPr>
+          <p:nvPr/>
+        </p:nvPicPr>
+        <p:blipFill>
+          <a:blip r:embed="rId4">
+            <a:extLst>
+              <a:ext uri="{28A0092B-C50C-407E-A947-70E740481C1C}">
+                <a14:useLocalDpi xmlns:a14="http://schemas.microsoft.com/office/drawing/2010/main" val="0"/>
+              </a:ext>
+              <a:ext uri="{96DAC541-7B7A-43D3-8B79-37D633B846F1}">
+                <asvg:svgBlip xmlns:asvg="http://schemas.microsoft.com/office/drawing/2016/SVG/main" r:embed="rId5"/>
+              </a:ext>
+            </a:extLst>
+          </a:blip>
+          <a:stretch>
+            <a:fillRect/>
+          </a:stretch>
+        </p:blipFill>
+        <p:spPr>
+          <a:xfrm>
+            <a:off x="2662457" y="2798798"/>
+            <a:ext cx="1321325" cy="1321325"/>
+          </a:xfrm>
+          <a:prstGeom prst="rect">
+            <a:avLst/>
+          </a:prstGeom>
+        </p:spPr>
+      </p:pic>
+      <p:sp>
+        <p:nvSpPr>
+          <p:cNvPr id="34" name="Rounded Rectangle 11">
+            <a:extLst>
+              <a:ext uri="{FF2B5EF4-FFF2-40B4-BE49-F238E27FC236}">
+                <a16:creationId xmlns:a16="http://schemas.microsoft.com/office/drawing/2014/main" id="{7D7C3154-4760-4AC2-85BC-969637B5858E}"/>
+              </a:ext>
+            </a:extLst>
+          </p:cNvPr>
+          <p:cNvSpPr/>
+          <p:nvPr/>
+        </p:nvSpPr>
+        <p:spPr>
+          <a:xfrm>
+            <a:off x="2662457" y="1752600"/>
+            <a:ext cx="7213063" cy="4480560"/>
           </a:xfrm>
           <a:prstGeom prst="roundRect">
             <a:avLst>
@@ -3353,11 +3504,356 @@
             </a:avLst>
           </a:prstGeom>
           <a:noFill/>
-          <a:ln w="19050">
+          <a:ln w="6350">
             <a:solidFill>
               <a:schemeClr val="tx1"/>
             </a:solidFill>
-            <a:prstDash val="sysDot"/>
+            <a:prstDash val="solid"/>
+          </a:ln>
+          <a:effectLst/>
+        </p:spPr>
+        <p:style>
+          <a:lnRef idx="1">
+            <a:schemeClr val="accent1"/>
+          </a:lnRef>
+          <a:fillRef idx="3">
+            <a:schemeClr val="accent1"/>
+          </a:fillRef>
+          <a:effectRef idx="2">
+            <a:schemeClr val="accent1"/>
+          </a:effectRef>
+          <a:fontRef idx="minor">
+            <a:schemeClr val="lt1"/>
+          </a:fontRef>
+        </p:style>
+        <p:txBody>
+          <a:bodyPr anchor="ctr"/>
+          <a:lstStyle/>
+          <a:p>
+            <a:pPr algn="ctr" fontAlgn="auto">
+              <a:spcBef>
+                <a:spcPts val="0"/>
+              </a:spcBef>
+              <a:spcAft>
+                <a:spcPts val="0"/>
+              </a:spcAft>
+              <a:defRPr/>
+            </a:pPr>
+            <a:endParaRPr lang="en-US" dirty="0">
+              <a:solidFill>
+                <a:schemeClr val="tx1"/>
+              </a:solidFill>
+              <a:latin typeface="Arial"/>
+              <a:cs typeface="Arial"/>
+            </a:endParaRPr>
+          </a:p>
+          <a:p>
+            <a:pPr algn="ctr" fontAlgn="auto">
+              <a:spcBef>
+                <a:spcPts val="0"/>
+              </a:spcBef>
+              <a:spcAft>
+                <a:spcPts val="0"/>
+              </a:spcAft>
+              <a:defRPr/>
+            </a:pPr>
+            <a:endParaRPr lang="en-US" dirty="0">
+              <a:solidFill>
+                <a:schemeClr val="tx1"/>
+              </a:solidFill>
+              <a:latin typeface="Arial"/>
+              <a:cs typeface="Arial"/>
+            </a:endParaRPr>
+          </a:p>
+          <a:p>
+            <a:pPr algn="ctr" fontAlgn="auto">
+              <a:spcBef>
+                <a:spcPts val="0"/>
+              </a:spcBef>
+              <a:spcAft>
+                <a:spcPts val="0"/>
+              </a:spcAft>
+              <a:defRPr/>
+            </a:pPr>
+            <a:endParaRPr lang="en-US" dirty="0">
+              <a:solidFill>
+                <a:schemeClr val="tx1"/>
+              </a:solidFill>
+              <a:latin typeface="Arial"/>
+              <a:cs typeface="Arial"/>
+            </a:endParaRPr>
+          </a:p>
+          <a:p>
+            <a:pPr algn="ctr" fontAlgn="auto">
+              <a:spcBef>
+                <a:spcPts val="0"/>
+              </a:spcBef>
+              <a:spcAft>
+                <a:spcPts val="0"/>
+              </a:spcAft>
+              <a:defRPr/>
+            </a:pPr>
+            <a:endParaRPr lang="en-US" dirty="0">
+              <a:solidFill>
+                <a:schemeClr val="tx1"/>
+              </a:solidFill>
+              <a:latin typeface="Arial"/>
+              <a:cs typeface="Arial"/>
+            </a:endParaRPr>
+          </a:p>
+          <a:p>
+            <a:pPr algn="ctr" fontAlgn="auto">
+              <a:spcBef>
+                <a:spcPts val="0"/>
+              </a:spcBef>
+              <a:spcAft>
+                <a:spcPts val="0"/>
+              </a:spcAft>
+              <a:defRPr/>
+            </a:pPr>
+            <a:endParaRPr lang="en-US" dirty="0">
+              <a:solidFill>
+                <a:schemeClr val="tx1"/>
+              </a:solidFill>
+              <a:latin typeface="Arial"/>
+              <a:cs typeface="Arial"/>
+            </a:endParaRPr>
+          </a:p>
+          <a:p>
+            <a:pPr algn="ctr" fontAlgn="auto">
+              <a:spcBef>
+                <a:spcPts val="0"/>
+              </a:spcBef>
+              <a:spcAft>
+                <a:spcPts val="0"/>
+              </a:spcAft>
+              <a:defRPr/>
+            </a:pPr>
+            <a:endParaRPr lang="en-US" dirty="0">
+              <a:solidFill>
+                <a:schemeClr val="tx1"/>
+              </a:solidFill>
+              <a:latin typeface="Arial"/>
+              <a:cs typeface="Arial"/>
+            </a:endParaRPr>
+          </a:p>
+          <a:p>
+            <a:pPr algn="ctr" fontAlgn="auto">
+              <a:spcBef>
+                <a:spcPts val="0"/>
+              </a:spcBef>
+              <a:spcAft>
+                <a:spcPts val="0"/>
+              </a:spcAft>
+              <a:defRPr/>
+            </a:pPr>
+            <a:endParaRPr lang="en-US" dirty="0">
+              <a:solidFill>
+                <a:schemeClr val="tx1"/>
+              </a:solidFill>
+              <a:latin typeface="Arial"/>
+              <a:cs typeface="Arial"/>
+            </a:endParaRPr>
+          </a:p>
+          <a:p>
+            <a:pPr algn="ctr" fontAlgn="auto">
+              <a:spcBef>
+                <a:spcPts val="0"/>
+              </a:spcBef>
+              <a:spcAft>
+                <a:spcPts val="0"/>
+              </a:spcAft>
+              <a:defRPr/>
+            </a:pPr>
+            <a:endParaRPr lang="en-US" dirty="0">
+              <a:solidFill>
+                <a:schemeClr val="tx1"/>
+              </a:solidFill>
+              <a:latin typeface="Arial"/>
+              <a:cs typeface="Arial"/>
+            </a:endParaRPr>
+          </a:p>
+          <a:p>
+            <a:pPr algn="ctr" fontAlgn="auto">
+              <a:spcBef>
+                <a:spcPts val="0"/>
+              </a:spcBef>
+              <a:spcAft>
+                <a:spcPts val="0"/>
+              </a:spcAft>
+              <a:defRPr/>
+            </a:pPr>
+            <a:endParaRPr lang="en-US" dirty="0">
+              <a:solidFill>
+                <a:schemeClr val="tx1"/>
+              </a:solidFill>
+              <a:latin typeface="Arial"/>
+              <a:cs typeface="Arial"/>
+            </a:endParaRPr>
+          </a:p>
+          <a:p>
+            <a:pPr algn="ctr" fontAlgn="auto">
+              <a:spcBef>
+                <a:spcPts val="0"/>
+              </a:spcBef>
+              <a:spcAft>
+                <a:spcPts val="0"/>
+              </a:spcAft>
+              <a:defRPr/>
+            </a:pPr>
+            <a:endParaRPr lang="en-US" dirty="0">
+              <a:solidFill>
+                <a:schemeClr val="tx1"/>
+              </a:solidFill>
+              <a:latin typeface="Arial"/>
+              <a:cs typeface="Arial"/>
+            </a:endParaRPr>
+          </a:p>
+          <a:p>
+            <a:pPr algn="ctr" fontAlgn="auto">
+              <a:spcBef>
+                <a:spcPts val="0"/>
+              </a:spcBef>
+              <a:spcAft>
+                <a:spcPts val="0"/>
+              </a:spcAft>
+              <a:defRPr/>
+            </a:pPr>
+            <a:endParaRPr lang="en-US" dirty="0">
+              <a:solidFill>
+                <a:schemeClr val="tx1"/>
+              </a:solidFill>
+              <a:latin typeface="Arial"/>
+              <a:cs typeface="Arial"/>
+            </a:endParaRPr>
+          </a:p>
+          <a:p>
+            <a:pPr algn="ctr" fontAlgn="auto">
+              <a:spcBef>
+                <a:spcPts val="0"/>
+              </a:spcBef>
+              <a:spcAft>
+                <a:spcPts val="0"/>
+              </a:spcAft>
+              <a:defRPr/>
+            </a:pPr>
+            <a:endParaRPr lang="en-US" dirty="0">
+              <a:solidFill>
+                <a:schemeClr val="tx1"/>
+              </a:solidFill>
+              <a:latin typeface="Arial"/>
+              <a:cs typeface="Arial"/>
+            </a:endParaRPr>
+          </a:p>
+          <a:p>
+            <a:pPr algn="ctr" fontAlgn="auto">
+              <a:spcBef>
+                <a:spcPts val="0"/>
+              </a:spcBef>
+              <a:spcAft>
+                <a:spcPts val="0"/>
+              </a:spcAft>
+              <a:defRPr/>
+            </a:pPr>
+            <a:endParaRPr lang="en-US" dirty="0">
+              <a:solidFill>
+                <a:schemeClr val="tx1"/>
+              </a:solidFill>
+              <a:latin typeface="Amazon Ember" charset="0"/>
+              <a:ea typeface="Amazon Ember" charset="0"/>
+              <a:cs typeface="Amazon Ember" charset="0"/>
+            </a:endParaRPr>
+          </a:p>
+          <a:p>
+            <a:pPr algn="ctr" fontAlgn="auto">
+              <a:spcBef>
+                <a:spcPts val="0"/>
+              </a:spcBef>
+              <a:spcAft>
+                <a:spcPts val="0"/>
+              </a:spcAft>
+              <a:defRPr/>
+            </a:pPr>
+            <a:endParaRPr lang="en-US" dirty="0">
+              <a:solidFill>
+                <a:schemeClr val="tx1"/>
+              </a:solidFill>
+              <a:latin typeface="Amazon Ember" charset="0"/>
+              <a:ea typeface="Amazon Ember" charset="0"/>
+              <a:cs typeface="Amazon Ember" charset="0"/>
+            </a:endParaRPr>
+          </a:p>
+          <a:p>
+            <a:pPr algn="ctr" fontAlgn="auto">
+              <a:spcBef>
+                <a:spcPts val="0"/>
+              </a:spcBef>
+              <a:spcAft>
+                <a:spcPts val="0"/>
+              </a:spcAft>
+              <a:defRPr/>
+            </a:pPr>
+            <a:endParaRPr lang="en-US" dirty="0">
+              <a:solidFill>
+                <a:schemeClr val="tx1"/>
+              </a:solidFill>
+              <a:latin typeface="Amazon Ember" charset="0"/>
+              <a:ea typeface="Amazon Ember" charset="0"/>
+              <a:cs typeface="Amazon Ember" charset="0"/>
+            </a:endParaRPr>
+          </a:p>
+          <a:p>
+            <a:pPr algn="ctr" fontAlgn="auto">
+              <a:spcBef>
+                <a:spcPts val="0"/>
+              </a:spcBef>
+              <a:spcAft>
+                <a:spcPts val="0"/>
+              </a:spcAft>
+              <a:defRPr/>
+            </a:pPr>
+            <a:r>
+              <a:rPr lang="en-US" dirty="0">
+                <a:solidFill>
+                  <a:schemeClr val="tx1"/>
+                </a:solidFill>
+                <a:latin typeface="Amazon Ember" charset="0"/>
+                <a:ea typeface="Amazon Ember" charset="0"/>
+                <a:cs typeface="Amazon Ember" charset="0"/>
+              </a:rPr>
+              <a:t>AWS Region</a:t>
+            </a:r>
+          </a:p>
+        </p:txBody>
+      </p:sp>
+      <p:sp>
+        <p:nvSpPr>
+          <p:cNvPr id="6" name="Rounded Rectangle 21">
+            <a:extLst>
+              <a:ext uri="{FF2B5EF4-FFF2-40B4-BE49-F238E27FC236}">
+                <a16:creationId xmlns:a16="http://schemas.microsoft.com/office/drawing/2014/main" id="{85124796-557D-40F8-A76D-45B7DFD62471}"/>
+              </a:ext>
+            </a:extLst>
+          </p:cNvPr>
+          <p:cNvSpPr/>
+          <p:nvPr/>
+        </p:nvSpPr>
+        <p:spPr>
+          <a:xfrm>
+            <a:off x="6897689" y="2605167"/>
+            <a:ext cx="1752600" cy="1955576"/>
+          </a:xfrm>
+          <a:prstGeom prst="roundRect">
+            <a:avLst>
+              <a:gd name="adj" fmla="val 9818"/>
+            </a:avLst>
+          </a:prstGeom>
+          <a:noFill/>
+          <a:ln w="6350">
+            <a:solidFill>
+              <a:schemeClr val="tx1"/>
+            </a:solidFill>
+            <a:prstDash val="solid"/>
           </a:ln>
           <a:effectLst/>
         </p:spPr>
@@ -3400,151 +3896,10 @@
       </p:sp>
       <p:sp>
         <p:nvSpPr>
-          <p:cNvPr id="5" name="Rounded Rectangle 9">
-            <a:extLst>
-              <a:ext uri="{FF2B5EF4-FFF2-40B4-BE49-F238E27FC236}">
-                <a16:creationId xmlns:a16="http://schemas.microsoft.com/office/drawing/2014/main" id="{9CBC35DC-F409-457B-8361-041C1D5CBE7A}"/>
-              </a:ext>
-            </a:extLst>
-          </p:cNvPr>
-          <p:cNvSpPr/>
-          <p:nvPr/>
-        </p:nvSpPr>
-        <p:spPr>
-          <a:xfrm>
-            <a:off x="3848100" y="2040017"/>
-            <a:ext cx="4946650" cy="2777965"/>
-          </a:xfrm>
-          <a:prstGeom prst="roundRect">
-            <a:avLst>
-              <a:gd name="adj" fmla="val 9818"/>
-            </a:avLst>
-          </a:prstGeom>
-          <a:solidFill>
-            <a:schemeClr val="accent4">
-              <a:lumMod val="20000"/>
-              <a:lumOff val="80000"/>
-            </a:schemeClr>
-          </a:solidFill>
-          <a:ln w="19050">
-            <a:solidFill>
-              <a:srgbClr val="FFC000"/>
-            </a:solidFill>
-            <a:prstDash val="dash"/>
-          </a:ln>
-          <a:effectLst/>
-        </p:spPr>
-        <p:style>
-          <a:lnRef idx="1">
-            <a:schemeClr val="accent1"/>
-          </a:lnRef>
-          <a:fillRef idx="3">
-            <a:schemeClr val="accent1"/>
-          </a:fillRef>
-          <a:effectRef idx="2">
-            <a:schemeClr val="accent1"/>
-          </a:effectRef>
-          <a:fontRef idx="minor">
-            <a:schemeClr val="lt1"/>
-          </a:fontRef>
-        </p:style>
-        <p:txBody>
-          <a:bodyPr anchor="ctr"/>
-          <a:lstStyle/>
-          <a:p>
-            <a:pPr algn="ctr" fontAlgn="auto">
-              <a:spcBef>
-                <a:spcPts val="0"/>
-              </a:spcBef>
-              <a:spcAft>
-                <a:spcPts val="0"/>
-              </a:spcAft>
-              <a:defRPr/>
-            </a:pPr>
-            <a:endParaRPr lang="en-US" dirty="0">
-              <a:solidFill>
-                <a:schemeClr val="tx1"/>
-              </a:solidFill>
-              <a:latin typeface="Helvetica Neue"/>
-              <a:cs typeface="Helvetica Neue"/>
-            </a:endParaRPr>
-          </a:p>
-        </p:txBody>
-      </p:sp>
-      <p:sp>
-        <p:nvSpPr>
-          <p:cNvPr id="6" name="Rounded Rectangle 21">
-            <a:extLst>
-              <a:ext uri="{FF2B5EF4-FFF2-40B4-BE49-F238E27FC236}">
-                <a16:creationId xmlns:a16="http://schemas.microsoft.com/office/drawing/2014/main" id="{85124796-557D-40F8-A76D-45B7DFD62471}"/>
-              </a:ext>
-            </a:extLst>
-          </p:cNvPr>
-          <p:cNvSpPr/>
-          <p:nvPr/>
-        </p:nvSpPr>
-        <p:spPr>
-          <a:xfrm>
-            <a:off x="6897689" y="2605167"/>
-            <a:ext cx="1752600" cy="1955576"/>
-          </a:xfrm>
-          <a:prstGeom prst="roundRect">
-            <a:avLst>
-              <a:gd name="adj" fmla="val 9818"/>
-            </a:avLst>
-          </a:prstGeom>
-          <a:noFill/>
-          <a:ln w="6350">
-            <a:solidFill>
-              <a:schemeClr val="tx1"/>
-            </a:solidFill>
-            <a:prstDash val="solid"/>
-          </a:ln>
-          <a:effectLst/>
-        </p:spPr>
-        <p:style>
-          <a:lnRef idx="1">
-            <a:schemeClr val="accent1"/>
-          </a:lnRef>
-          <a:fillRef idx="3">
-            <a:schemeClr val="accent1"/>
-          </a:fillRef>
-          <a:effectRef idx="2">
-            <a:schemeClr val="accent1"/>
-          </a:effectRef>
-          <a:fontRef idx="minor">
-            <a:schemeClr val="lt1"/>
-          </a:fontRef>
-        </p:style>
-        <p:txBody>
-          <a:bodyPr anchor="ctr"/>
-          <a:lstStyle/>
-          <a:p>
-            <a:pPr algn="ctr" fontAlgn="auto">
-              <a:spcBef>
-                <a:spcPts val="0"/>
-              </a:spcBef>
-              <a:spcAft>
-                <a:spcPts val="0"/>
-              </a:spcAft>
-              <a:defRPr/>
-            </a:pPr>
-            <a:endParaRPr lang="en-US" dirty="0">
-              <a:solidFill>
-                <a:schemeClr val="tx1"/>
-              </a:solidFill>
-              <a:latin typeface="Helvetica Neue"/>
-              <a:cs typeface="Helvetica Neue"/>
-            </a:endParaRPr>
-          </a:p>
-        </p:txBody>
-      </p:sp>
-      <p:sp>
-        <p:nvSpPr>
-          <p:cNvPr id="7" name="TextBox 33">
-            <a:extLst>
-              <a:ext uri="{FF2B5EF4-FFF2-40B4-BE49-F238E27FC236}">
-                <a16:creationId xmlns:a16="http://schemas.microsoft.com/office/drawing/2014/main" id="{3E7E47B1-37F6-4166-91BF-7002A91C5882}"/>
+          <p:cNvPr id="8" name="TextBox 37">
+            <a:extLst>
+              <a:ext uri="{FF2B5EF4-FFF2-40B4-BE49-F238E27FC236}">
+                <a16:creationId xmlns:a16="http://schemas.microsoft.com/office/drawing/2014/main" id="{9C3B5CC4-8CA3-44F1-AC27-AE17DB340869}"/>
               </a:ext>
             </a:extLst>
           </p:cNvPr>
@@ -3555,7 +3910,7 @@
         </p:nvSpPr>
         <p:spPr bwMode="auto">
           <a:xfrm>
-            <a:off x="5036911" y="4890339"/>
+            <a:off x="6992658" y="4310142"/>
             <a:ext cx="1555750" cy="230832"/>
           </a:xfrm>
           <a:prstGeom prst="rect">
@@ -3582,110 +3937,26 @@
                 <a:ea typeface="Verdana" pitchFamily="34" charset="0"/>
                 <a:cs typeface="Helvetica Neue"/>
               </a:rPr>
-              <a:t>AWS Region</a:t>
-            </a:r>
-          </a:p>
-        </p:txBody>
-      </p:sp>
-      <p:sp>
-        <p:nvSpPr>
-          <p:cNvPr id="8" name="TextBox 37">
-            <a:extLst>
-              <a:ext uri="{FF2B5EF4-FFF2-40B4-BE49-F238E27FC236}">
-                <a16:creationId xmlns:a16="http://schemas.microsoft.com/office/drawing/2014/main" id="{9C3B5CC4-8CA3-44F1-AC27-AE17DB340869}"/>
-              </a:ext>
-            </a:extLst>
-          </p:cNvPr>
-          <p:cNvSpPr txBox="1">
-            <a:spLocks noChangeArrowheads="1"/>
-          </p:cNvSpPr>
+              <a:t>virtual private cloud</a:t>
+            </a:r>
+          </a:p>
+        </p:txBody>
+      </p:sp>
+      <p:sp>
+        <p:nvSpPr>
+          <p:cNvPr id="10" name="TextBox 9">
+            <a:extLst>
+              <a:ext uri="{FF2B5EF4-FFF2-40B4-BE49-F238E27FC236}">
+                <a16:creationId xmlns:a16="http://schemas.microsoft.com/office/drawing/2014/main" id="{F0A5CA87-8F54-4451-805B-9F911416AE51}"/>
+              </a:ext>
+            </a:extLst>
+          </p:cNvPr>
+          <p:cNvSpPr txBox="1"/>
           <p:nvPr/>
         </p:nvSpPr>
-        <p:spPr bwMode="auto">
-          <a:xfrm>
-            <a:off x="6992658" y="4310142"/>
-            <a:ext cx="1555750" cy="230832"/>
-          </a:xfrm>
-          <a:prstGeom prst="rect">
-            <a:avLst/>
-          </a:prstGeom>
-          <a:noFill/>
-          <a:ln w="9525">
-            <a:noFill/>
-            <a:miter lim="800000"/>
-            <a:headEnd/>
-            <a:tailEnd/>
-          </a:ln>
-        </p:spPr>
-        <p:txBody>
-          <a:bodyPr anchor="t">
-            <a:spAutoFit/>
-          </a:bodyPr>
-          <a:lstStyle/>
-          <a:p>
-            <a:pPr algn="ctr"/>
-            <a:r>
-              <a:rPr lang="en-US" sz="900" b="1" dirty="0">
-                <a:latin typeface="+mj-lt"/>
-                <a:ea typeface="Verdana" pitchFamily="34" charset="0"/>
-                <a:cs typeface="Helvetica Neue"/>
-              </a:rPr>
-              <a:t>virtual private cloud</a:t>
-            </a:r>
-          </a:p>
-        </p:txBody>
-      </p:sp>
-      <p:pic>
-        <p:nvPicPr>
-          <p:cNvPr id="9" name="Picture 8">
-            <a:extLst>
-              <a:ext uri="{FF2B5EF4-FFF2-40B4-BE49-F238E27FC236}">
-                <a16:creationId xmlns:a16="http://schemas.microsoft.com/office/drawing/2014/main" id="{EC5BE8F9-7300-479B-AE0A-C91C636F2058}"/>
-              </a:ext>
-            </a:extLst>
-          </p:cNvPr>
-          <p:cNvPicPr>
-            <a:picLocks noChangeAspect="1"/>
-          </p:cNvPicPr>
-          <p:nvPr/>
-        </p:nvPicPr>
-        <p:blipFill>
-          <a:blip r:embed="rId2">
-            <a:extLst>
-              <a:ext uri="{28A0092B-C50C-407E-A947-70E740481C1C}">
-                <a14:useLocalDpi xmlns:a14="http://schemas.microsoft.com/office/drawing/2010/main" val="0"/>
-              </a:ext>
-            </a:extLst>
-          </a:blip>
-          <a:stretch>
-            <a:fillRect/>
-          </a:stretch>
-        </p:blipFill>
         <p:spPr>
           <a:xfrm>
-            <a:off x="6973443" y="2414667"/>
-            <a:ext cx="415967" cy="271302"/>
-          </a:xfrm>
-          <a:prstGeom prst="rect">
-            <a:avLst/>
-          </a:prstGeom>
-        </p:spPr>
-      </p:pic>
-      <p:sp>
-        <p:nvSpPr>
-          <p:cNvPr id="10" name="TextBox 9">
-            <a:extLst>
-              <a:ext uri="{FF2B5EF4-FFF2-40B4-BE49-F238E27FC236}">
-                <a16:creationId xmlns:a16="http://schemas.microsoft.com/office/drawing/2014/main" id="{F0A5CA87-8F54-4451-805B-9F911416AE51}"/>
-              </a:ext>
-            </a:extLst>
-          </p:cNvPr>
-          <p:cNvSpPr txBox="1"/>
-          <p:nvPr/>
-        </p:nvSpPr>
-        <p:spPr>
-          <a:xfrm>
-            <a:off x="2819402" y="3806905"/>
+            <a:off x="2819402" y="3801632"/>
             <a:ext cx="944563" cy="696054"/>
           </a:xfrm>
           <a:prstGeom prst="rect">
@@ -3998,7 +4269,7 @@
         </p:nvSpPr>
         <p:spPr>
           <a:xfrm>
-            <a:off x="8936208" y="3741751"/>
+            <a:off x="8707692" y="3239663"/>
             <a:ext cx="883575" cy="646331"/>
           </a:xfrm>
           <a:prstGeom prst="rect">
@@ -4058,7 +4329,7 @@
               </a:rPr>
               <a:t>bucket</a:t>
             </a:r>
-            <a:endParaRPr lang="en-US" sz="900">
+            <a:endParaRPr lang="en-US" sz="900" dirty="0">
               <a:cs typeface="Arial"/>
             </a:endParaRPr>
           </a:p>
@@ -4078,7 +4349,7 @@
         </p:nvSpPr>
         <p:spPr>
           <a:xfrm>
-            <a:off x="7132497" y="3666666"/>
+            <a:off x="7136646" y="3810644"/>
             <a:ext cx="636588" cy="195156"/>
           </a:xfrm>
           <a:prstGeom prst="rect">
@@ -4116,7 +4387,7 @@
           <p:nvPr/>
         </p:nvPicPr>
         <p:blipFill>
-          <a:blip r:embed="rId3">
+          <a:blip r:embed="rId6">
             <a:extLst>
               <a:ext uri="{28A0092B-C50C-407E-A947-70E740481C1C}">
                 <a14:useLocalDpi xmlns:a14="http://schemas.microsoft.com/office/drawing/2010/main" val="0"/>
@@ -4129,7 +4400,7 @@
         </p:blipFill>
         <p:spPr>
           <a:xfrm>
-            <a:off x="7180215" y="3042903"/>
+            <a:off x="7197789" y="3182327"/>
             <a:ext cx="544781" cy="564959"/>
           </a:xfrm>
           <a:prstGeom prst="rect">
@@ -4151,7 +4422,7 @@
         </p:nvSpPr>
         <p:spPr>
           <a:xfrm>
-            <a:off x="5775046" y="3792480"/>
+            <a:off x="5782514" y="3808178"/>
             <a:ext cx="1128037" cy="155632"/>
           </a:xfrm>
           <a:prstGeom prst="rect">
@@ -4187,7 +4458,7 @@
         </p:nvSpPr>
         <p:spPr>
           <a:xfrm>
-            <a:off x="1588516" y="3801632"/>
+            <a:off x="5545208" y="5405923"/>
             <a:ext cx="1101584" cy="369332"/>
           </a:xfrm>
           <a:prstGeom prst="rect">
@@ -4237,13 +4508,15 @@
               </a:ext>
             </a:extLst>
           </p:cNvPr>
-          <p:cNvCxnSpPr/>
+          <p:cNvCxnSpPr>
+            <a:cxnSpLocks/>
+          </p:cNvCxnSpPr>
           <p:nvPr/>
         </p:nvCxnSpPr>
         <p:spPr>
-          <a:xfrm flipV="1">
-            <a:off x="4641730" y="3450076"/>
-            <a:ext cx="461265" cy="7595"/>
+          <a:xfrm>
+            <a:off x="4647826" y="3457673"/>
+            <a:ext cx="473162" cy="5392"/>
           </a:xfrm>
           <a:prstGeom prst="straightConnector1">
             <a:avLst/>
@@ -4281,7 +4554,7 @@
         </p:nvSpPr>
         <p:spPr>
           <a:xfrm>
-            <a:off x="7772038" y="3666666"/>
+            <a:off x="7776187" y="3810644"/>
             <a:ext cx="636588" cy="195156"/>
           </a:xfrm>
           <a:prstGeom prst="rect">
@@ -4320,192 +4593,8 @@
         </p:nvCxnSpPr>
         <p:spPr>
           <a:xfrm>
-            <a:off x="5563372" y="3472439"/>
-            <a:ext cx="501013" cy="353"/>
-          </a:xfrm>
-          <a:prstGeom prst="straightConnector1">
-            <a:avLst/>
-          </a:prstGeom>
-          <a:ln w="28575">
-            <a:tailEnd type="triangle"/>
-          </a:ln>
-        </p:spPr>
-        <p:style>
-          <a:lnRef idx="2">
-            <a:schemeClr val="dk1"/>
-          </a:lnRef>
-          <a:fillRef idx="0">
-            <a:schemeClr val="dk1"/>
-          </a:fillRef>
-          <a:effectRef idx="1">
-            <a:schemeClr val="dk1"/>
-          </a:effectRef>
-          <a:fontRef idx="minor">
-            <a:schemeClr val="tx1"/>
-          </a:fontRef>
-        </p:style>
-      </p:cxnSp>
-      <p:cxnSp>
-        <p:nvCxnSpPr>
-          <p:cNvPr id="28" name="Straight Arrow Connector 27">
-            <a:extLst>
-              <a:ext uri="{FF2B5EF4-FFF2-40B4-BE49-F238E27FC236}">
-                <a16:creationId xmlns:a16="http://schemas.microsoft.com/office/drawing/2014/main" id="{86B5EB9C-D7F3-4F0B-AAA3-624DEBCB0EDC}"/>
-              </a:ext>
-            </a:extLst>
-          </p:cNvPr>
-          <p:cNvCxnSpPr>
-            <a:cxnSpLocks/>
-          </p:cNvCxnSpPr>
-          <p:nvPr/>
-        </p:nvCxnSpPr>
-        <p:spPr>
-          <a:xfrm>
-            <a:off x="3686601" y="3454052"/>
-            <a:ext cx="501014" cy="353"/>
-          </a:xfrm>
-          <a:prstGeom prst="straightConnector1">
-            <a:avLst/>
-          </a:prstGeom>
-          <a:ln w="28575">
-            <a:tailEnd type="triangle"/>
-          </a:ln>
-        </p:spPr>
-        <p:style>
-          <a:lnRef idx="2">
-            <a:schemeClr val="dk1"/>
-          </a:lnRef>
-          <a:fillRef idx="0">
-            <a:schemeClr val="dk1"/>
-          </a:fillRef>
-          <a:effectRef idx="1">
-            <a:schemeClr val="dk1"/>
-          </a:effectRef>
-          <a:fontRef idx="minor">
-            <a:schemeClr val="tx1"/>
-          </a:fontRef>
-        </p:style>
-      </p:cxnSp>
-      <p:sp>
-        <p:nvSpPr>
-          <p:cNvPr id="29" name="TextBox 28">
-            <a:extLst>
-              <a:ext uri="{FF2B5EF4-FFF2-40B4-BE49-F238E27FC236}">
-                <a16:creationId xmlns:a16="http://schemas.microsoft.com/office/drawing/2014/main" id="{BDAE98BB-6F0C-4EF2-A43F-ABF46C33AA88}"/>
-              </a:ext>
-            </a:extLst>
-          </p:cNvPr>
-          <p:cNvSpPr txBox="1"/>
-          <p:nvPr/>
-        </p:nvSpPr>
-        <p:spPr>
-          <a:xfrm>
-            <a:off x="4765686" y="3806809"/>
-            <a:ext cx="1146175" cy="465395"/>
-          </a:xfrm>
-          <a:prstGeom prst="rect">
-            <a:avLst/>
-          </a:prstGeom>
-          <a:noFill/>
-        </p:spPr>
-        <p:txBody>
-          <a:bodyPr wrap="square" lIns="0" tIns="0" rIns="0" bIns="0" rtlCol="0" anchor="t">
-            <a:noAutofit/>
-          </a:bodyPr>
-          <a:lstStyle/>
-          <a:p>
-            <a:pPr algn="ctr"/>
-            <a:r>
-              <a:rPr lang="en-US" sz="1000" b="1" dirty="0">
-                <a:cs typeface="Arial"/>
-              </a:rPr>
-              <a:t>CTR </a:t>
-            </a:r>
-          </a:p>
-          <a:p>
-            <a:pPr algn="ctr"/>
-            <a:r>
-              <a:rPr lang="en-US" sz="1000" b="1" dirty="0">
-                <a:cs typeface="Arial"/>
-              </a:rPr>
-              <a:t>Kinesis Firehose</a:t>
-            </a:r>
-          </a:p>
-          <a:p>
-            <a:pPr algn="ctr"/>
-            <a:r>
-              <a:rPr lang="en-US" sz="1000" b="1" dirty="0">
-                <a:cs typeface="Arial"/>
-              </a:rPr>
-              <a:t>delivery stream</a:t>
-            </a:r>
-          </a:p>
-        </p:txBody>
-      </p:sp>
-      <p:sp>
-        <p:nvSpPr>
-          <p:cNvPr id="30" name="TextBox 33">
-            <a:extLst>
-              <a:ext uri="{FF2B5EF4-FFF2-40B4-BE49-F238E27FC236}">
-                <a16:creationId xmlns:a16="http://schemas.microsoft.com/office/drawing/2014/main" id="{4971454D-ED94-4F3B-8C27-1E2C9DF47F09}"/>
-              </a:ext>
-            </a:extLst>
-          </p:cNvPr>
-          <p:cNvSpPr txBox="1">
-            <a:spLocks noChangeArrowheads="1"/>
-          </p:cNvSpPr>
-          <p:nvPr/>
-        </p:nvSpPr>
-        <p:spPr bwMode="auto">
-          <a:xfrm>
-            <a:off x="4872362" y="2040017"/>
-            <a:ext cx="3075564" cy="253916"/>
-          </a:xfrm>
-          <a:prstGeom prst="rect">
-            <a:avLst/>
-          </a:prstGeom>
-          <a:noFill/>
-          <a:ln w="9525">
-            <a:noFill/>
-            <a:miter lim="800000"/>
-            <a:headEnd/>
-            <a:tailEnd/>
-          </a:ln>
-        </p:spPr>
-        <p:txBody>
-          <a:bodyPr wrap="square" anchor="t">
-            <a:spAutoFit/>
-          </a:bodyPr>
-          <a:lstStyle/>
-          <a:p>
-            <a:pPr algn="ctr"/>
-            <a:r>
-              <a:rPr lang="en-US" sz="1050" b="1" dirty="0">
-                <a:cs typeface="Arial"/>
-              </a:rPr>
-              <a:t>Evaluate for Amazon Connect Integration</a:t>
-            </a:r>
-          </a:p>
-        </p:txBody>
-      </p:sp>
-      <p:cxnSp>
-        <p:nvCxnSpPr>
-          <p:cNvPr id="31" name="Straight Arrow Connector 30">
-            <a:extLst>
-              <a:ext uri="{FF2B5EF4-FFF2-40B4-BE49-F238E27FC236}">
-                <a16:creationId xmlns:a16="http://schemas.microsoft.com/office/drawing/2014/main" id="{1FFCBAD6-F442-4E55-8C37-2E927DB51F22}"/>
-              </a:ext>
-            </a:extLst>
-          </p:cNvPr>
-          <p:cNvCxnSpPr>
-            <a:cxnSpLocks/>
-          </p:cNvCxnSpPr>
-          <p:nvPr/>
-        </p:nvCxnSpPr>
-        <p:spPr>
-          <a:xfrm flipH="1" flipV="1">
-            <a:off x="2475398" y="3446457"/>
-            <a:ext cx="445008" cy="7595"/>
+            <a:off x="5631952" y="3472439"/>
+            <a:ext cx="491368" cy="0"/>
           </a:xfrm>
           <a:prstGeom prst="straightConnector1">
             <a:avLst/>
@@ -4544,13 +4633,13 @@
           <p:nvPr/>
         </p:nvPicPr>
         <p:blipFill>
-          <a:blip r:embed="rId4">
+          <a:blip r:embed="rId7">
             <a:extLst>
               <a:ext uri="{28A0092B-C50C-407E-A947-70E740481C1C}">
                 <a14:useLocalDpi xmlns:a14="http://schemas.microsoft.com/office/drawing/2010/main" val="0"/>
               </a:ext>
               <a:ext uri="{96DAC541-7B7A-43D3-8B79-37D633B846F1}">
-                <asvg:svgBlip xmlns:asvg="http://schemas.microsoft.com/office/drawing/2016/SVG/main" r:embed="rId5"/>
+                <asvg:svgBlip xmlns:asvg="http://schemas.microsoft.com/office/drawing/2016/SVG/main" r:embed="rId8"/>
               </a:ext>
             </a:extLst>
           </a:blip>
@@ -4560,14 +4649,157 @@
         </p:blipFill>
         <p:spPr>
           <a:xfrm>
-            <a:off x="7614082" y="2849132"/>
-            <a:ext cx="952500" cy="952500"/>
+            <a:off x="7604899" y="2965641"/>
+            <a:ext cx="997082" cy="997082"/>
           </a:xfrm>
           <a:prstGeom prst="rect">
             <a:avLst/>
           </a:prstGeom>
         </p:spPr>
       </p:pic>
+      <p:cxnSp>
+        <p:nvCxnSpPr>
+          <p:cNvPr id="28" name="Straight Arrow Connector 27">
+            <a:extLst>
+              <a:ext uri="{FF2B5EF4-FFF2-40B4-BE49-F238E27FC236}">
+                <a16:creationId xmlns:a16="http://schemas.microsoft.com/office/drawing/2014/main" id="{86B5EB9C-D7F3-4F0B-AAA3-624DEBCB0EDC}"/>
+              </a:ext>
+            </a:extLst>
+          </p:cNvPr>
+          <p:cNvCxnSpPr>
+            <a:cxnSpLocks/>
+          </p:cNvCxnSpPr>
+          <p:nvPr/>
+        </p:nvCxnSpPr>
+        <p:spPr>
+          <a:xfrm>
+            <a:off x="3709461" y="3454052"/>
+            <a:ext cx="468000" cy="353"/>
+          </a:xfrm>
+          <a:prstGeom prst="straightConnector1">
+            <a:avLst/>
+          </a:prstGeom>
+          <a:ln w="28575">
+            <a:tailEnd type="triangle"/>
+          </a:ln>
+        </p:spPr>
+        <p:style>
+          <a:lnRef idx="2">
+            <a:schemeClr val="dk1"/>
+          </a:lnRef>
+          <a:fillRef idx="0">
+            <a:schemeClr val="dk1"/>
+          </a:fillRef>
+          <a:effectRef idx="1">
+            <a:schemeClr val="dk1"/>
+          </a:effectRef>
+          <a:fontRef idx="minor">
+            <a:schemeClr val="tx1"/>
+          </a:fontRef>
+        </p:style>
+      </p:cxnSp>
+      <p:sp>
+        <p:nvSpPr>
+          <p:cNvPr id="29" name="TextBox 28">
+            <a:extLst>
+              <a:ext uri="{FF2B5EF4-FFF2-40B4-BE49-F238E27FC236}">
+                <a16:creationId xmlns:a16="http://schemas.microsoft.com/office/drawing/2014/main" id="{BDAE98BB-6F0C-4EF2-A43F-ABF46C33AA88}"/>
+              </a:ext>
+            </a:extLst>
+          </p:cNvPr>
+          <p:cNvSpPr txBox="1"/>
+          <p:nvPr/>
+        </p:nvSpPr>
+        <p:spPr>
+          <a:xfrm>
+            <a:off x="4765686" y="3806809"/>
+            <a:ext cx="1146175" cy="465395"/>
+          </a:xfrm>
+          <a:prstGeom prst="rect">
+            <a:avLst/>
+          </a:prstGeom>
+          <a:noFill/>
+        </p:spPr>
+        <p:txBody>
+          <a:bodyPr wrap="square" lIns="0" tIns="0" rIns="0" bIns="0" rtlCol="0" anchor="t">
+            <a:noAutofit/>
+          </a:bodyPr>
+          <a:lstStyle/>
+          <a:p>
+            <a:pPr algn="ctr"/>
+            <a:r>
+              <a:rPr lang="en-US" sz="1000" b="1" dirty="0">
+                <a:cs typeface="Arial"/>
+              </a:rPr>
+              <a:t>CTR </a:t>
+            </a:r>
+          </a:p>
+          <a:p>
+            <a:pPr algn="ctr"/>
+            <a:r>
+              <a:rPr lang="en-US" sz="1000" b="1" dirty="0">
+                <a:cs typeface="Arial"/>
+              </a:rPr>
+              <a:t>Kinesis Firehose</a:t>
+            </a:r>
+          </a:p>
+          <a:p>
+            <a:pPr algn="ctr"/>
+            <a:r>
+              <a:rPr lang="en-US" sz="1000" b="1" dirty="0">
+                <a:cs typeface="Arial"/>
+              </a:rPr>
+              <a:t>delivery stream</a:t>
+            </a:r>
+          </a:p>
+        </p:txBody>
+      </p:sp>
+      <p:sp>
+        <p:nvSpPr>
+          <p:cNvPr id="30" name="TextBox 33">
+            <a:extLst>
+              <a:ext uri="{FF2B5EF4-FFF2-40B4-BE49-F238E27FC236}">
+                <a16:creationId xmlns:a16="http://schemas.microsoft.com/office/drawing/2014/main" id="{4971454D-ED94-4F3B-8C27-1E2C9DF47F09}"/>
+              </a:ext>
+            </a:extLst>
+          </p:cNvPr>
+          <p:cNvSpPr txBox="1">
+            <a:spLocks noChangeArrowheads="1"/>
+          </p:cNvSpPr>
+          <p:nvPr/>
+        </p:nvSpPr>
+        <p:spPr bwMode="auto">
+          <a:xfrm>
+            <a:off x="3956158" y="2074093"/>
+            <a:ext cx="5692507" cy="253916"/>
+          </a:xfrm>
+          <a:prstGeom prst="rect">
+            <a:avLst/>
+          </a:prstGeom>
+          <a:noFill/>
+          <a:ln w="9525">
+            <a:noFill/>
+            <a:miter lim="800000"/>
+            <a:headEnd/>
+            <a:tailEnd/>
+          </a:ln>
+        </p:spPr>
+        <p:txBody>
+          <a:bodyPr wrap="square" anchor="t">
+            <a:spAutoFit/>
+          </a:bodyPr>
+          <a:lstStyle/>
+          <a:p>
+            <a:pPr algn="ctr"/>
+            <a:r>
+              <a:rPr lang="en-US" sz="1050" b="1" dirty="0">
+                <a:cs typeface="Arial"/>
+              </a:rPr>
+              <a:t>Evaluate for Amazon Connect Integration</a:t>
+            </a:r>
+          </a:p>
+        </p:txBody>
+      </p:sp>
       <p:pic>
         <p:nvPicPr>
           <p:cNvPr id="40" name="Graphic 39">
@@ -4583,13 +4815,13 @@
           <p:nvPr/>
         </p:nvPicPr>
         <p:blipFill>
-          <a:blip r:embed="rId6">
+          <a:blip r:embed="rId9">
             <a:extLst>
               <a:ext uri="{28A0092B-C50C-407E-A947-70E740481C1C}">
                 <a14:useLocalDpi xmlns:a14="http://schemas.microsoft.com/office/drawing/2010/main" val="0"/>
               </a:ext>
               <a:ext uri="{96DAC541-7B7A-43D3-8B79-37D633B846F1}">
-                <asvg:svgBlip xmlns:asvg="http://schemas.microsoft.com/office/drawing/2016/SVG/main" r:embed="rId7"/>
+                <asvg:svgBlip xmlns:asvg="http://schemas.microsoft.com/office/drawing/2016/SVG/main" r:embed="rId10"/>
               </a:ext>
             </a:extLst>
           </a:blip>
@@ -4609,10 +4841,10 @@
       </p:pic>
       <p:pic>
         <p:nvPicPr>
-          <p:cNvPr id="42" name="Graphic 41">
-            <a:extLst>
-              <a:ext uri="{FF2B5EF4-FFF2-40B4-BE49-F238E27FC236}">
-                <a16:creationId xmlns:a16="http://schemas.microsoft.com/office/drawing/2014/main" id="{7DC0AA00-CE7D-4E7A-8976-BF6BD567C0D3}"/>
+          <p:cNvPr id="35" name="Picture 34">
+            <a:extLst>
+              <a:ext uri="{FF2B5EF4-FFF2-40B4-BE49-F238E27FC236}">
+                <a16:creationId xmlns:a16="http://schemas.microsoft.com/office/drawing/2014/main" id="{28C06977-1A2B-423A-9F1E-FF2E314AC7BD}"/>
               </a:ext>
             </a:extLst>
           </p:cNvPr>
@@ -4622,13 +4854,10 @@
           <p:nvPr/>
         </p:nvPicPr>
         <p:blipFill>
-          <a:blip r:embed="rId8">
+          <a:blip r:embed="rId11">
             <a:extLst>
               <a:ext uri="{28A0092B-C50C-407E-A947-70E740481C1C}">
                 <a14:useLocalDpi xmlns:a14="http://schemas.microsoft.com/office/drawing/2010/main" val="0"/>
-              </a:ext>
-              <a:ext uri="{96DAC541-7B7A-43D3-8B79-37D633B846F1}">
-                <asvg:svgBlip xmlns:asvg="http://schemas.microsoft.com/office/drawing/2016/SVG/main" r:embed="rId9"/>
               </a:ext>
             </a:extLst>
           </a:blip>
@@ -4638,14 +4867,55 @@
         </p:blipFill>
         <p:spPr>
           <a:xfrm>
-            <a:off x="4861378" y="2981421"/>
-            <a:ext cx="952500" cy="952500"/>
+            <a:off x="3131197" y="1419578"/>
+            <a:ext cx="747083" cy="487680"/>
           </a:xfrm>
           <a:prstGeom prst="rect">
             <a:avLst/>
           </a:prstGeom>
         </p:spPr>
       </p:pic>
+      <p:cxnSp>
+        <p:nvCxnSpPr>
+          <p:cNvPr id="38" name="Straight Arrow Connector 37">
+            <a:extLst>
+              <a:ext uri="{FF2B5EF4-FFF2-40B4-BE49-F238E27FC236}">
+                <a16:creationId xmlns:a16="http://schemas.microsoft.com/office/drawing/2014/main" id="{EE66EBD1-AC64-4720-996C-060E33819292}"/>
+              </a:ext>
+            </a:extLst>
+          </p:cNvPr>
+          <p:cNvCxnSpPr>
+            <a:cxnSpLocks/>
+          </p:cNvCxnSpPr>
+          <p:nvPr/>
+        </p:nvCxnSpPr>
+        <p:spPr>
+          <a:xfrm>
+            <a:off x="6655671" y="3472439"/>
+            <a:ext cx="550998" cy="0"/>
+          </a:xfrm>
+          <a:prstGeom prst="straightConnector1">
+            <a:avLst/>
+          </a:prstGeom>
+          <a:ln w="28575">
+            <a:tailEnd type="triangle"/>
+          </a:ln>
+        </p:spPr>
+        <p:style>
+          <a:lnRef idx="2">
+            <a:schemeClr val="dk1"/>
+          </a:lnRef>
+          <a:fillRef idx="0">
+            <a:schemeClr val="dk1"/>
+          </a:fillRef>
+          <a:effectRef idx="1">
+            <a:schemeClr val="dk1"/>
+          </a:effectRef>
+          <a:fontRef idx="minor">
+            <a:schemeClr val="tx1"/>
+          </a:fontRef>
+        </p:style>
+      </p:cxnSp>
       <p:pic>
         <p:nvPicPr>
           <p:cNvPr id="44" name="Graphic 43">
@@ -4661,13 +4931,13 @@
           <p:nvPr/>
         </p:nvPicPr>
         <p:blipFill>
-          <a:blip r:embed="rId10">
+          <a:blip r:embed="rId12">
             <a:extLst>
               <a:ext uri="{28A0092B-C50C-407E-A947-70E740481C1C}">
                 <a14:useLocalDpi xmlns:a14="http://schemas.microsoft.com/office/drawing/2010/main" val="0"/>
               </a:ext>
               <a:ext uri="{96DAC541-7B7A-43D3-8B79-37D633B846F1}">
-                <asvg:svgBlip xmlns:asvg="http://schemas.microsoft.com/office/drawing/2016/SVG/main" r:embed="rId11"/>
+                <asvg:svgBlip xmlns:asvg="http://schemas.microsoft.com/office/drawing/2016/SVG/main" r:embed="rId13"/>
               </a:ext>
             </a:extLst>
           </a:blip>
@@ -4677,8 +4947,8 @@
         </p:blipFill>
         <p:spPr>
           <a:xfrm>
-            <a:off x="5913993" y="2909886"/>
-            <a:ext cx="952500" cy="952500"/>
+            <a:off x="5991670" y="3057442"/>
+            <a:ext cx="796941" cy="796941"/>
           </a:xfrm>
           <a:prstGeom prst="rect">
             <a:avLst/>
@@ -4687,10 +4957,10 @@
       </p:pic>
       <p:pic>
         <p:nvPicPr>
-          <p:cNvPr id="48" name="Graphic 47">
-            <a:extLst>
-              <a:ext uri="{FF2B5EF4-FFF2-40B4-BE49-F238E27FC236}">
-                <a16:creationId xmlns:a16="http://schemas.microsoft.com/office/drawing/2014/main" id="{A6398F71-E5DE-4655-AC6A-E38F0BED3C50}"/>
+          <p:cNvPr id="43" name="Graphic 42">
+            <a:extLst>
+              <a:ext uri="{FF2B5EF4-FFF2-40B4-BE49-F238E27FC236}">
+                <a16:creationId xmlns:a16="http://schemas.microsoft.com/office/drawing/2014/main" id="{C2B805BC-6A5A-4D74-977E-772F9753992A}"/>
               </a:ext>
             </a:extLst>
           </p:cNvPr>
@@ -4700,13 +4970,13 @@
           <p:nvPr/>
         </p:nvPicPr>
         <p:blipFill>
-          <a:blip r:embed="rId12">
+          <a:blip r:embed="rId14">
             <a:extLst>
               <a:ext uri="{28A0092B-C50C-407E-A947-70E740481C1C}">
                 <a14:useLocalDpi xmlns:a14="http://schemas.microsoft.com/office/drawing/2010/main" val="0"/>
               </a:ext>
               <a:ext uri="{96DAC541-7B7A-43D3-8B79-37D633B846F1}">
-                <asvg:svgBlip xmlns:asvg="http://schemas.microsoft.com/office/drawing/2016/SVG/main" r:embed="rId13"/>
+                <asvg:svgBlip xmlns:asvg="http://schemas.microsoft.com/office/drawing/2016/SVG/main" r:embed="rId15"/>
               </a:ext>
             </a:extLst>
           </a:blip>
@@ -4716,20 +4986,186 @@
         </p:blipFill>
         <p:spPr>
           <a:xfrm>
-            <a:off x="2662457" y="2798798"/>
-            <a:ext cx="1321325" cy="1321325"/>
+            <a:off x="8673229" y="2481503"/>
+            <a:ext cx="936000" cy="936000"/>
           </a:xfrm>
           <a:prstGeom prst="rect">
             <a:avLst/>
           </a:prstGeom>
         </p:spPr>
       </p:pic>
+      <p:cxnSp>
+        <p:nvCxnSpPr>
+          <p:cNvPr id="45" name="Straight Arrow Connector 44">
+            <a:extLst>
+              <a:ext uri="{FF2B5EF4-FFF2-40B4-BE49-F238E27FC236}">
+                <a16:creationId xmlns:a16="http://schemas.microsoft.com/office/drawing/2014/main" id="{1BF7D454-46C3-4079-AF4B-AEE6AB91A881}"/>
+              </a:ext>
+            </a:extLst>
+          </p:cNvPr>
+          <p:cNvCxnSpPr>
+            <a:cxnSpLocks/>
+          </p:cNvCxnSpPr>
+          <p:nvPr/>
+        </p:nvCxnSpPr>
+        <p:spPr>
+          <a:xfrm flipV="1">
+            <a:off x="3323119" y="4005802"/>
+            <a:ext cx="0" cy="1160558"/>
+          </a:xfrm>
+          <a:prstGeom prst="straightConnector1">
+            <a:avLst/>
+          </a:prstGeom>
+          <a:ln w="28575">
+            <a:headEnd type="none" w="med" len="med"/>
+            <a:tailEnd type="none" w="med" len="med"/>
+          </a:ln>
+        </p:spPr>
+        <p:style>
+          <a:lnRef idx="2">
+            <a:schemeClr val="dk1"/>
+          </a:lnRef>
+          <a:fillRef idx="0">
+            <a:schemeClr val="dk1"/>
+          </a:fillRef>
+          <a:effectRef idx="1">
+            <a:schemeClr val="dk1"/>
+          </a:effectRef>
+          <a:fontRef idx="minor">
+            <a:schemeClr val="tx1"/>
+          </a:fontRef>
+        </p:style>
+      </p:cxnSp>
+      <p:cxnSp>
+        <p:nvCxnSpPr>
+          <p:cNvPr id="52" name="Straight Arrow Connector 51">
+            <a:extLst>
+              <a:ext uri="{FF2B5EF4-FFF2-40B4-BE49-F238E27FC236}">
+                <a16:creationId xmlns:a16="http://schemas.microsoft.com/office/drawing/2014/main" id="{A802BC4F-9931-48F7-A36A-DF0D5576FEB9}"/>
+              </a:ext>
+            </a:extLst>
+          </p:cNvPr>
+          <p:cNvCxnSpPr>
+            <a:cxnSpLocks/>
+          </p:cNvCxnSpPr>
+          <p:nvPr/>
+        </p:nvCxnSpPr>
+        <p:spPr>
+          <a:xfrm>
+            <a:off x="3311803" y="5158742"/>
+            <a:ext cx="2556000" cy="7618"/>
+          </a:xfrm>
+          <a:prstGeom prst="straightConnector1">
+            <a:avLst/>
+          </a:prstGeom>
+          <a:ln w="28575">
+            <a:tailEnd type="triangle"/>
+          </a:ln>
+        </p:spPr>
+        <p:style>
+          <a:lnRef idx="2">
+            <a:schemeClr val="dk1"/>
+          </a:lnRef>
+          <a:fillRef idx="0">
+            <a:schemeClr val="dk1"/>
+          </a:fillRef>
+          <a:effectRef idx="1">
+            <a:schemeClr val="dk1"/>
+          </a:effectRef>
+          <a:fontRef idx="minor">
+            <a:schemeClr val="tx1"/>
+          </a:fontRef>
+        </p:style>
+      </p:cxnSp>
+      <p:cxnSp>
+        <p:nvCxnSpPr>
+          <p:cNvPr id="53" name="Straight Arrow Connector 52">
+            <a:extLst>
+              <a:ext uri="{FF2B5EF4-FFF2-40B4-BE49-F238E27FC236}">
+                <a16:creationId xmlns:a16="http://schemas.microsoft.com/office/drawing/2014/main" id="{657B19DA-4FE3-41B4-8BCA-D98A50FFDAEC}"/>
+              </a:ext>
+            </a:extLst>
+          </p:cNvPr>
+          <p:cNvCxnSpPr>
+            <a:cxnSpLocks/>
+          </p:cNvCxnSpPr>
+          <p:nvPr/>
+        </p:nvCxnSpPr>
+        <p:spPr>
+          <a:xfrm>
+            <a:off x="5375728" y="4310142"/>
+            <a:ext cx="0" cy="848600"/>
+          </a:xfrm>
+          <a:prstGeom prst="straightConnector1">
+            <a:avLst/>
+          </a:prstGeom>
+          <a:ln w="28575">
+            <a:tailEnd type="triangle"/>
+          </a:ln>
+        </p:spPr>
+        <p:style>
+          <a:lnRef idx="2">
+            <a:schemeClr val="dk1"/>
+          </a:lnRef>
+          <a:fillRef idx="0">
+            <a:schemeClr val="dk1"/>
+          </a:fillRef>
+          <a:effectRef idx="1">
+            <a:schemeClr val="dk1"/>
+          </a:effectRef>
+          <a:fontRef idx="minor">
+            <a:schemeClr val="tx1"/>
+          </a:fontRef>
+        </p:style>
+      </p:cxnSp>
+      <p:cxnSp>
+        <p:nvCxnSpPr>
+          <p:cNvPr id="56" name="Straight Arrow Connector 55">
+            <a:extLst>
+              <a:ext uri="{FF2B5EF4-FFF2-40B4-BE49-F238E27FC236}">
+                <a16:creationId xmlns:a16="http://schemas.microsoft.com/office/drawing/2014/main" id="{3426538A-CFDA-4DDB-AADD-9D4C4871935E}"/>
+              </a:ext>
+            </a:extLst>
+          </p:cNvPr>
+          <p:cNvCxnSpPr>
+            <a:cxnSpLocks/>
+          </p:cNvCxnSpPr>
+          <p:nvPr/>
+        </p:nvCxnSpPr>
+        <p:spPr>
+          <a:xfrm>
+            <a:off x="6268988" y="5158742"/>
+            <a:ext cx="526454" cy="0"/>
+          </a:xfrm>
+          <a:prstGeom prst="straightConnector1">
+            <a:avLst/>
+          </a:prstGeom>
+          <a:ln w="28575">
+            <a:headEnd type="none" w="med" len="med"/>
+            <a:tailEnd type="none" w="med" len="med"/>
+          </a:ln>
+        </p:spPr>
+        <p:style>
+          <a:lnRef idx="2">
+            <a:schemeClr val="dk1"/>
+          </a:lnRef>
+          <a:fillRef idx="0">
+            <a:schemeClr val="dk1"/>
+          </a:fillRef>
+          <a:effectRef idx="1">
+            <a:schemeClr val="dk1"/>
+          </a:effectRef>
+          <a:fontRef idx="minor">
+            <a:schemeClr val="tx1"/>
+          </a:fontRef>
+        </p:style>
+      </p:cxnSp>
       <p:pic>
         <p:nvPicPr>
-          <p:cNvPr id="50" name="Graphic 49">
-            <a:extLst>
-              <a:ext uri="{FF2B5EF4-FFF2-40B4-BE49-F238E27FC236}">
-                <a16:creationId xmlns:a16="http://schemas.microsoft.com/office/drawing/2014/main" id="{83CC9ABE-AFF0-4A88-81DC-6C8EB863AC94}"/>
+          <p:cNvPr id="19" name="Graphic 18">
+            <a:extLst>
+              <a:ext uri="{FF2B5EF4-FFF2-40B4-BE49-F238E27FC236}">
+                <a16:creationId xmlns:a16="http://schemas.microsoft.com/office/drawing/2014/main" id="{58AC2F58-885A-48FF-94BB-994B2189147C}"/>
               </a:ext>
             </a:extLst>
           </p:cNvPr>
@@ -4755,7 +5191,7 @@
         </p:blipFill>
         <p:spPr>
           <a:xfrm>
-            <a:off x="1676834" y="2965641"/>
+            <a:off x="5599976" y="4647467"/>
             <a:ext cx="952500" cy="952500"/>
           </a:xfrm>
           <a:prstGeom prst="rect">
@@ -4763,12 +5199,136 @@
           </a:prstGeom>
         </p:spPr>
       </p:pic>
+      <p:cxnSp>
+        <p:nvCxnSpPr>
+          <p:cNvPr id="60" name="Straight Arrow Connector 59">
+            <a:extLst>
+              <a:ext uri="{FF2B5EF4-FFF2-40B4-BE49-F238E27FC236}">
+                <a16:creationId xmlns:a16="http://schemas.microsoft.com/office/drawing/2014/main" id="{9908AF8D-1257-4689-8CAF-DE43ECA03F86}"/>
+              </a:ext>
+            </a:extLst>
+          </p:cNvPr>
+          <p:cNvCxnSpPr>
+            <a:cxnSpLocks/>
+          </p:cNvCxnSpPr>
+          <p:nvPr/>
+        </p:nvCxnSpPr>
+        <p:spPr>
+          <a:xfrm>
+            <a:off x="7468312" y="2963679"/>
+            <a:ext cx="0" cy="222670"/>
+          </a:xfrm>
+          <a:prstGeom prst="straightConnector1">
+            <a:avLst/>
+          </a:prstGeom>
+          <a:ln w="28575">
+            <a:headEnd type="none" w="med" len="med"/>
+            <a:tailEnd type="none" w="med" len="med"/>
+          </a:ln>
+        </p:spPr>
+        <p:style>
+          <a:lnRef idx="2">
+            <a:schemeClr val="dk1"/>
+          </a:lnRef>
+          <a:fillRef idx="0">
+            <a:schemeClr val="dk1"/>
+          </a:fillRef>
+          <a:effectRef idx="1">
+            <a:schemeClr val="dk1"/>
+          </a:effectRef>
+          <a:fontRef idx="minor">
+            <a:schemeClr val="tx1"/>
+          </a:fontRef>
+        </p:style>
+      </p:cxnSp>
+      <p:cxnSp>
+        <p:nvCxnSpPr>
+          <p:cNvPr id="62" name="Straight Arrow Connector 61">
+            <a:extLst>
+              <a:ext uri="{FF2B5EF4-FFF2-40B4-BE49-F238E27FC236}">
+                <a16:creationId xmlns:a16="http://schemas.microsoft.com/office/drawing/2014/main" id="{7B7CAF90-6969-4819-A934-DFF72126C7CD}"/>
+              </a:ext>
+            </a:extLst>
+          </p:cNvPr>
+          <p:cNvCxnSpPr>
+            <a:cxnSpLocks/>
+          </p:cNvCxnSpPr>
+          <p:nvPr/>
+        </p:nvCxnSpPr>
+        <p:spPr>
+          <a:xfrm>
+            <a:off x="7454939" y="2976230"/>
+            <a:ext cx="1476000" cy="15239"/>
+          </a:xfrm>
+          <a:prstGeom prst="straightConnector1">
+            <a:avLst/>
+          </a:prstGeom>
+          <a:ln w="28575">
+            <a:tailEnd type="triangle"/>
+          </a:ln>
+        </p:spPr>
+        <p:style>
+          <a:lnRef idx="2">
+            <a:schemeClr val="dk1"/>
+          </a:lnRef>
+          <a:fillRef idx="0">
+            <a:schemeClr val="dk1"/>
+          </a:fillRef>
+          <a:effectRef idx="1">
+            <a:schemeClr val="dk1"/>
+          </a:effectRef>
+          <a:fontRef idx="minor">
+            <a:schemeClr val="tx1"/>
+          </a:fontRef>
+        </p:style>
+      </p:cxnSp>
+      <p:cxnSp>
+        <p:nvCxnSpPr>
+          <p:cNvPr id="70" name="Straight Arrow Connector 69">
+            <a:extLst>
+              <a:ext uri="{FF2B5EF4-FFF2-40B4-BE49-F238E27FC236}">
+                <a16:creationId xmlns:a16="http://schemas.microsoft.com/office/drawing/2014/main" id="{082E7695-737F-4A7E-BAF8-50CC62FE5E56}"/>
+              </a:ext>
+            </a:extLst>
+          </p:cNvPr>
+          <p:cNvCxnSpPr>
+            <a:cxnSpLocks/>
+          </p:cNvCxnSpPr>
+          <p:nvPr/>
+        </p:nvCxnSpPr>
+        <p:spPr>
+          <a:xfrm flipV="1">
+            <a:off x="6782346" y="3473974"/>
+            <a:ext cx="0" cy="1692386"/>
+          </a:xfrm>
+          <a:prstGeom prst="straightConnector1">
+            <a:avLst/>
+          </a:prstGeom>
+          <a:ln w="28575">
+            <a:tailEnd type="triangle"/>
+          </a:ln>
+        </p:spPr>
+        <p:style>
+          <a:lnRef idx="2">
+            <a:schemeClr val="dk1"/>
+          </a:lnRef>
+          <a:fillRef idx="0">
+            <a:schemeClr val="dk1"/>
+          </a:fillRef>
+          <a:effectRef idx="1">
+            <a:schemeClr val="dk1"/>
+          </a:effectRef>
+          <a:fontRef idx="minor">
+            <a:schemeClr val="tx1"/>
+          </a:fontRef>
+        </p:style>
+      </p:cxnSp>
       <p:pic>
         <p:nvPicPr>
-          <p:cNvPr id="51" name="Graphic 50">
-            <a:extLst>
-              <a:ext uri="{FF2B5EF4-FFF2-40B4-BE49-F238E27FC236}">
-                <a16:creationId xmlns:a16="http://schemas.microsoft.com/office/drawing/2014/main" id="{3A44494D-13AB-467A-82BB-10204280475C}"/>
+          <p:cNvPr id="86" name="Picture 85">
+            <a:extLst>
+              <a:ext uri="{FF2B5EF4-FFF2-40B4-BE49-F238E27FC236}">
+                <a16:creationId xmlns:a16="http://schemas.microsoft.com/office/drawing/2014/main" id="{B6D0AC04-43CB-4C93-B021-58772422298D}"/>
               </a:ext>
             </a:extLst>
           </p:cNvPr>
@@ -4778,13 +5338,10 @@
           <p:nvPr/>
         </p:nvPicPr>
         <p:blipFill>
-          <a:blip r:embed="rId14">
+          <a:blip r:embed="rId16">
             <a:extLst>
               <a:ext uri="{28A0092B-C50C-407E-A947-70E740481C1C}">
                 <a14:useLocalDpi xmlns:a14="http://schemas.microsoft.com/office/drawing/2010/main" val="0"/>
-              </a:ext>
-              <a:ext uri="{96DAC541-7B7A-43D3-8B79-37D633B846F1}">
-                <asvg:svgBlip xmlns:asvg="http://schemas.microsoft.com/office/drawing/2016/SVG/main" r:embed="rId15"/>
               </a:ext>
             </a:extLst>
           </a:blip>
@@ -4794,8 +5351,8 @@
         </p:blipFill>
         <p:spPr>
           <a:xfrm>
-            <a:off x="8890442" y="2909322"/>
-            <a:ext cx="952500" cy="952500"/>
+            <a:off x="7038973" y="2416925"/>
+            <a:ext cx="415967" cy="271302"/>
           </a:xfrm>
           <a:prstGeom prst="rect">
             <a:avLst/>

</xml_diff>